<commit_message>
ppt and paper update
</commit_message>
<xml_diff>
--- a/Documentation/RC_CAR.pptx
+++ b/Documentation/RC_CAR.pptx
@@ -5,17 +5,18 @@
     <p:sldMasterId id="2147483648" r:id="rId1"/>
   </p:sldMasterIdLst>
   <p:notesMasterIdLst>
-    <p:notesMasterId r:id="rId10"/>
+    <p:notesMasterId r:id="rId11"/>
   </p:notesMasterIdLst>
   <p:sldIdLst>
     <p:sldId id="256" r:id="rId2"/>
     <p:sldId id="257" r:id="rId3"/>
     <p:sldId id="259" r:id="rId4"/>
-    <p:sldId id="260" r:id="rId5"/>
-    <p:sldId id="258" r:id="rId6"/>
-    <p:sldId id="261" r:id="rId7"/>
-    <p:sldId id="262" r:id="rId8"/>
-    <p:sldId id="263" r:id="rId9"/>
+    <p:sldId id="264" r:id="rId5"/>
+    <p:sldId id="260" r:id="rId6"/>
+    <p:sldId id="258" r:id="rId7"/>
+    <p:sldId id="261" r:id="rId8"/>
+    <p:sldId id="262" r:id="rId9"/>
+    <p:sldId id="263" r:id="rId10"/>
   </p:sldIdLst>
   <p:sldSz cx="12192000" cy="6858000"/>
   <p:notesSz cx="6858000" cy="9144000"/>
@@ -114,6 +115,11 @@
       </a:defRPr>
     </a:lvl9pPr>
   </p:defaultTextStyle>
+  <p:extLst>
+    <p:ext uri="{EFAFB233-063F-42B5-8137-9DF3F51BA10A}">
+      <p15:sldGuideLst xmlns:p15="http://schemas.microsoft.com/office/powerpoint/2012/main"/>
+    </p:ext>
+  </p:extLst>
 </p:presentation>
 </file>
 
@@ -636,7 +642,7 @@
           <a:p>
             <a:fld id="{E9EF8655-73E4-44B9-B8C0-E21199306151}" type="datetimeFigureOut">
               <a:rPr lang="nl-BE" smtClean="0"/>
-              <a:t>26/11/2024</a:t>
+              <a:t>2/12/2024</a:t>
             </a:fld>
             <a:endParaRPr lang="nl-BE"/>
           </a:p>
@@ -1137,7 +1143,7 @@
           <a:p>
             <a:fld id="{7923C555-3AB5-4532-9E20-23C21D0CB45B}" type="datetimeFigureOut">
               <a:rPr lang="nl-BE" smtClean="0"/>
-              <a:t>26/11/2024</a:t>
+              <a:t>2/12/2024</a:t>
             </a:fld>
             <a:endParaRPr lang="nl-BE"/>
           </a:p>
@@ -1337,7 +1343,7 @@
           <a:p>
             <a:fld id="{7923C555-3AB5-4532-9E20-23C21D0CB45B}" type="datetimeFigureOut">
               <a:rPr lang="nl-BE" smtClean="0"/>
-              <a:t>26/11/2024</a:t>
+              <a:t>2/12/2024</a:t>
             </a:fld>
             <a:endParaRPr lang="nl-BE"/>
           </a:p>
@@ -1547,7 +1553,7 @@
           <a:p>
             <a:fld id="{7923C555-3AB5-4532-9E20-23C21D0CB45B}" type="datetimeFigureOut">
               <a:rPr lang="nl-BE" smtClean="0"/>
-              <a:t>26/11/2024</a:t>
+              <a:t>2/12/2024</a:t>
             </a:fld>
             <a:endParaRPr lang="nl-BE"/>
           </a:p>
@@ -1747,7 +1753,7 @@
           <a:p>
             <a:fld id="{7923C555-3AB5-4532-9E20-23C21D0CB45B}" type="datetimeFigureOut">
               <a:rPr lang="nl-BE" smtClean="0"/>
-              <a:t>26/11/2024</a:t>
+              <a:t>2/12/2024</a:t>
             </a:fld>
             <a:endParaRPr lang="nl-BE"/>
           </a:p>
@@ -2023,7 +2029,7 @@
           <a:p>
             <a:fld id="{7923C555-3AB5-4532-9E20-23C21D0CB45B}" type="datetimeFigureOut">
               <a:rPr lang="nl-BE" smtClean="0"/>
-              <a:t>26/11/2024</a:t>
+              <a:t>2/12/2024</a:t>
             </a:fld>
             <a:endParaRPr lang="nl-BE"/>
           </a:p>
@@ -2291,7 +2297,7 @@
           <a:p>
             <a:fld id="{7923C555-3AB5-4532-9E20-23C21D0CB45B}" type="datetimeFigureOut">
               <a:rPr lang="nl-BE" smtClean="0"/>
-              <a:t>26/11/2024</a:t>
+              <a:t>2/12/2024</a:t>
             </a:fld>
             <a:endParaRPr lang="nl-BE"/>
           </a:p>
@@ -2706,7 +2712,7 @@
           <a:p>
             <a:fld id="{7923C555-3AB5-4532-9E20-23C21D0CB45B}" type="datetimeFigureOut">
               <a:rPr lang="nl-BE" smtClean="0"/>
-              <a:t>26/11/2024</a:t>
+              <a:t>2/12/2024</a:t>
             </a:fld>
             <a:endParaRPr lang="nl-BE"/>
           </a:p>
@@ -2848,7 +2854,7 @@
           <a:p>
             <a:fld id="{7923C555-3AB5-4532-9E20-23C21D0CB45B}" type="datetimeFigureOut">
               <a:rPr lang="nl-BE" smtClean="0"/>
-              <a:t>26/11/2024</a:t>
+              <a:t>2/12/2024</a:t>
             </a:fld>
             <a:endParaRPr lang="nl-BE"/>
           </a:p>
@@ -2961,7 +2967,7 @@
           <a:p>
             <a:fld id="{7923C555-3AB5-4532-9E20-23C21D0CB45B}" type="datetimeFigureOut">
               <a:rPr lang="nl-BE" smtClean="0"/>
-              <a:t>26/11/2024</a:t>
+              <a:t>2/12/2024</a:t>
             </a:fld>
             <a:endParaRPr lang="nl-BE"/>
           </a:p>
@@ -3274,7 +3280,7 @@
           <a:p>
             <a:fld id="{7923C555-3AB5-4532-9E20-23C21D0CB45B}" type="datetimeFigureOut">
               <a:rPr lang="nl-BE" smtClean="0"/>
-              <a:t>26/11/2024</a:t>
+              <a:t>2/12/2024</a:t>
             </a:fld>
             <a:endParaRPr lang="nl-BE"/>
           </a:p>
@@ -3563,7 +3569,7 @@
           <a:p>
             <a:fld id="{7923C555-3AB5-4532-9E20-23C21D0CB45B}" type="datetimeFigureOut">
               <a:rPr lang="nl-BE" smtClean="0"/>
-              <a:t>26/11/2024</a:t>
+              <a:t>2/12/2024</a:t>
             </a:fld>
             <a:endParaRPr lang="nl-BE"/>
           </a:p>
@@ -3806,7 +3812,7 @@
           <a:p>
             <a:fld id="{7923C555-3AB5-4532-9E20-23C21D0CB45B}" type="datetimeFigureOut">
               <a:rPr lang="nl-BE" smtClean="0"/>
-              <a:t>26/11/2024</a:t>
+              <a:t>2/12/2024</a:t>
             </a:fld>
             <a:endParaRPr lang="nl-BE"/>
           </a:p>
@@ -5512,7 +5518,7 @@
         </p:nvSpPr>
         <p:spPr>
           <a:xfrm>
-            <a:off x="838200" y="365125"/>
+            <a:off x="828040" y="365125"/>
             <a:ext cx="10515600" cy="1325563"/>
           </a:xfrm>
         </p:spPr>
@@ -6168,35 +6174,157 @@
           </a:p>
         </p:txBody>
       </p:sp>
+      <p:pic>
+        <p:nvPicPr>
+          <p:cNvPr id="4" name="Afbeelding 3" descr="Afbeelding met tekst, diagram, Plan, schermopname&#10;&#10;Automatisch gegenereerde beschrijving">
+            <a:extLst>
+              <a:ext uri="{FF2B5EF4-FFF2-40B4-BE49-F238E27FC236}">
+                <a16:creationId xmlns:a16="http://schemas.microsoft.com/office/drawing/2014/main" id="{01538E62-B75B-C5C4-15AE-227C6DA15D67}"/>
+              </a:ext>
+            </a:extLst>
+          </p:cNvPr>
+          <p:cNvPicPr>
+            <a:picLocks noChangeAspect="1"/>
+          </p:cNvPicPr>
+          <p:nvPr/>
+        </p:nvPicPr>
+        <p:blipFill>
+          <a:blip r:embed="rId2"/>
+          <a:stretch>
+            <a:fillRect/>
+          </a:stretch>
+        </p:blipFill>
+        <p:spPr>
+          <a:xfrm>
+            <a:off x="501445" y="2055813"/>
+            <a:ext cx="6188177" cy="4296880"/>
+          </a:xfrm>
+          <a:prstGeom prst="rect">
+            <a:avLst/>
+          </a:prstGeom>
+        </p:spPr>
+      </p:pic>
       <p:sp>
         <p:nvSpPr>
-          <p:cNvPr id="3" name="Tijdelijke aanduiding voor inhoud 2">
+          <p:cNvPr id="5" name="Tekstvak 4">
             <a:extLst>
               <a:ext uri="{FF2B5EF4-FFF2-40B4-BE49-F238E27FC236}">
-                <a16:creationId xmlns:a16="http://schemas.microsoft.com/office/drawing/2014/main" id="{8884CDBB-DDA0-D141-77F9-F40D0BD54C65}"/>
+                <a16:creationId xmlns:a16="http://schemas.microsoft.com/office/drawing/2014/main" id="{0510F6AE-AB2C-C311-FCA8-26078E12E316}"/>
               </a:ext>
             </a:extLst>
           </p:cNvPr>
-          <p:cNvSpPr>
-            <a:spLocks noGrp="1"/>
-          </p:cNvSpPr>
-          <p:nvPr>
-            <p:ph idx="1"/>
-          </p:nvPr>
+          <p:cNvSpPr txBox="1"/>
+          <p:nvPr/>
         </p:nvSpPr>
         <p:spPr>
           <a:xfrm>
-            <a:off x="838200" y="1929384"/>
-            <a:ext cx="10515600" cy="4251960"/>
+            <a:off x="7109355" y="2926080"/>
+            <a:ext cx="4930260" cy="2308324"/>
           </a:xfrm>
+          <a:prstGeom prst="rect">
+            <a:avLst/>
+          </a:prstGeom>
+          <a:noFill/>
         </p:spPr>
         <p:txBody>
-          <a:bodyPr>
-            <a:normAutofit/>
+          <a:bodyPr wrap="none" rtlCol="0">
+            <a:spAutoFit/>
           </a:bodyPr>
           <a:lstStyle/>
           <a:p>
-            <a:endParaRPr lang="nl-BE" sz="2200"/>
+            <a:pPr marL="285750" indent="-285750">
+              <a:buFont typeface="Arial" panose="020B0604020202020204" pitchFamily="34" charset="0"/>
+              <a:buChar char="•"/>
+            </a:pPr>
+            <a:r>
+              <a:rPr lang="en-GB" dirty="0"/>
+              <a:t>12V battery power source</a:t>
+            </a:r>
+          </a:p>
+          <a:p>
+            <a:pPr marL="285750" indent="-285750">
+              <a:buFont typeface="Arial" panose="020B0604020202020204" pitchFamily="34" charset="0"/>
+              <a:buChar char="•"/>
+            </a:pPr>
+            <a:r>
+              <a:rPr lang="en-GB" dirty="0"/>
+              <a:t>5V linear regulator for </a:t>
+            </a:r>
+            <a:r>
+              <a:rPr lang="en-GB" dirty="0" err="1"/>
+              <a:t>PSoC</a:t>
+            </a:r>
+            <a:r>
+              <a:rPr lang="en-GB" dirty="0"/>
+              <a:t> power source</a:t>
+            </a:r>
+          </a:p>
+          <a:p>
+            <a:pPr marL="285750" indent="-285750">
+              <a:buFont typeface="Arial" panose="020B0604020202020204" pitchFamily="34" charset="0"/>
+              <a:buChar char="•"/>
+            </a:pPr>
+            <a:r>
+              <a:rPr lang="en-GB" dirty="0"/>
+              <a:t>MPU6050 I²C interfaced temperature sensor/</a:t>
+            </a:r>
+          </a:p>
+          <a:p>
+            <a:r>
+              <a:rPr lang="en-GB" dirty="0"/>
+              <a:t>      accelerometer/gyroscope </a:t>
+            </a:r>
+          </a:p>
+          <a:p>
+            <a:pPr marL="285750" indent="-285750">
+              <a:buFont typeface="Arial" panose="020B0604020202020204" pitchFamily="34" charset="0"/>
+              <a:buChar char="•"/>
+            </a:pPr>
+            <a:r>
+              <a:rPr lang="en-GB" dirty="0"/>
+              <a:t>Logic level shifter using </a:t>
+            </a:r>
+            <a:r>
+              <a:rPr lang="en-GB" dirty="0" err="1"/>
+              <a:t>mosfets</a:t>
+            </a:r>
+            <a:endParaRPr lang="en-GB" dirty="0"/>
+          </a:p>
+          <a:p>
+            <a:pPr marL="285750" indent="-285750">
+              <a:buFont typeface="Arial" panose="020B0604020202020204" pitchFamily="34" charset="0"/>
+              <a:buChar char="•"/>
+            </a:pPr>
+            <a:r>
+              <a:rPr lang="en-GB" sz="1800" dirty="0">
+                <a:effectLst/>
+                <a:latin typeface="Aptos" panose="020B0004020202020204" pitchFamily="34" charset="0"/>
+                <a:ea typeface="Aptos" panose="020B0004020202020204" pitchFamily="34" charset="0"/>
+                <a:cs typeface="Arial" panose="020B0604020202020204" pitchFamily="34" charset="0"/>
+              </a:rPr>
+              <a:t>L293D H bridge I</a:t>
+            </a:r>
+            <a:r>
+              <a:rPr lang="en-GB" dirty="0">
+                <a:latin typeface="Aptos" panose="020B0004020202020204" pitchFamily="34" charset="0"/>
+                <a:ea typeface="Aptos" panose="020B0004020202020204" pitchFamily="34" charset="0"/>
+                <a:cs typeface="Arial" panose="020B0604020202020204" pitchFamily="34" charset="0"/>
+              </a:rPr>
+              <a:t>C</a:t>
+            </a:r>
+          </a:p>
+          <a:p>
+            <a:pPr marL="285750" indent="-285750">
+              <a:buFont typeface="Arial" panose="020B0604020202020204" pitchFamily="34" charset="0"/>
+              <a:buChar char="•"/>
+            </a:pPr>
+            <a:r>
+              <a:rPr lang="en-GB" dirty="0"/>
+              <a:t>Two DC motors </a:t>
+            </a:r>
+          </a:p>
+          <a:p>
+            <a:endParaRPr lang="nl-BE" dirty="0"/>
           </a:p>
         </p:txBody>
       </p:sp>
@@ -6214,6 +6342,191 @@
 </file>
 
 <file path=ppt/slides/slide4.xml><?xml version="1.0" encoding="utf-8"?>
+<p:sld xmlns:a="http://schemas.openxmlformats.org/drawingml/2006/main" xmlns:r="http://schemas.openxmlformats.org/officeDocument/2006/relationships" xmlns:p="http://schemas.openxmlformats.org/presentationml/2006/main">
+  <p:cSld>
+    <p:spTree>
+      <p:nvGrpSpPr>
+        <p:cNvPr id="1" name="">
+          <a:extLst>
+            <a:ext uri="{FF2B5EF4-FFF2-40B4-BE49-F238E27FC236}">
+              <a16:creationId xmlns:a16="http://schemas.microsoft.com/office/drawing/2014/main" id="{75814131-F8E7-63E3-E21C-1A18E2C7D305}"/>
+            </a:ext>
+          </a:extLst>
+        </p:cNvPr>
+        <p:cNvGrpSpPr/>
+        <p:nvPr/>
+      </p:nvGrpSpPr>
+      <p:grpSpPr>
+        <a:xfrm>
+          <a:off x="0" y="0"/>
+          <a:ext cx="0" cy="0"/>
+          <a:chOff x="0" y="0"/>
+          <a:chExt cx="0" cy="0"/>
+        </a:xfrm>
+      </p:grpSpPr>
+      <p:sp>
+        <p:nvSpPr>
+          <p:cNvPr id="2" name="Titel 1">
+            <a:extLst>
+              <a:ext uri="{FF2B5EF4-FFF2-40B4-BE49-F238E27FC236}">
+                <a16:creationId xmlns:a16="http://schemas.microsoft.com/office/drawing/2014/main" id="{1B24391A-8832-05C2-2C1E-8F011C17467C}"/>
+              </a:ext>
+            </a:extLst>
+          </p:cNvPr>
+          <p:cNvSpPr>
+            <a:spLocks noGrp="1"/>
+          </p:cNvSpPr>
+          <p:nvPr>
+            <p:ph type="title"/>
+          </p:nvPr>
+        </p:nvSpPr>
+        <p:spPr>
+          <a:xfrm>
+            <a:off x="838200" y="365125"/>
+            <a:ext cx="10515600" cy="1325563"/>
+          </a:xfrm>
+        </p:spPr>
+        <p:txBody>
+          <a:bodyPr>
+            <a:normAutofit/>
+          </a:bodyPr>
+          <a:lstStyle/>
+          <a:p>
+            <a:r>
+              <a:rPr lang="en-GB" sz="5400"/>
+              <a:t>Car System</a:t>
+            </a:r>
+            <a:endParaRPr lang="nl-BE" sz="5400"/>
+          </a:p>
+        </p:txBody>
+      </p:sp>
+      <p:pic>
+        <p:nvPicPr>
+          <p:cNvPr id="3" name="Afbeelding 2" descr="Foto openen">
+            <a:extLst>
+              <a:ext uri="{FF2B5EF4-FFF2-40B4-BE49-F238E27FC236}">
+                <a16:creationId xmlns:a16="http://schemas.microsoft.com/office/drawing/2014/main" id="{0A688D9C-C89D-E273-617D-24E219AC293A}"/>
+              </a:ext>
+            </a:extLst>
+          </p:cNvPr>
+          <p:cNvPicPr>
+            <a:picLocks noChangeAspect="1"/>
+          </p:cNvPicPr>
+          <p:nvPr/>
+        </p:nvPicPr>
+        <p:blipFill>
+          <a:blip r:embed="rId2" cstate="print">
+            <a:extLst>
+              <a:ext uri="{28A0092B-C50C-407E-A947-70E740481C1C}">
+                <a14:useLocalDpi xmlns:a14="http://schemas.microsoft.com/office/drawing/2010/main" val="0"/>
+              </a:ext>
+            </a:extLst>
+          </a:blip>
+          <a:srcRect/>
+          <a:stretch>
+            <a:fillRect/>
+          </a:stretch>
+        </p:blipFill>
+        <p:spPr bwMode="auto">
+          <a:xfrm>
+            <a:off x="1222952" y="1966195"/>
+            <a:ext cx="3547837" cy="3266205"/>
+          </a:xfrm>
+          <a:prstGeom prst="rect">
+            <a:avLst/>
+          </a:prstGeom>
+          <a:noFill/>
+          <a:ln>
+            <a:noFill/>
+          </a:ln>
+        </p:spPr>
+      </p:pic>
+      <p:sp>
+        <p:nvSpPr>
+          <p:cNvPr id="5" name="Tekstvak 4">
+            <a:extLst>
+              <a:ext uri="{FF2B5EF4-FFF2-40B4-BE49-F238E27FC236}">
+                <a16:creationId xmlns:a16="http://schemas.microsoft.com/office/drawing/2014/main" id="{69C6CB85-6BEC-BEDE-72B5-C59E8CFFC6D6}"/>
+              </a:ext>
+            </a:extLst>
+          </p:cNvPr>
+          <p:cNvSpPr txBox="1"/>
+          <p:nvPr/>
+        </p:nvSpPr>
+        <p:spPr>
+          <a:xfrm>
+            <a:off x="527508" y="5728601"/>
+            <a:ext cx="4938724" cy="369332"/>
+          </a:xfrm>
+          <a:prstGeom prst="rect">
+            <a:avLst/>
+          </a:prstGeom>
+          <a:noFill/>
+        </p:spPr>
+        <p:txBody>
+          <a:bodyPr wrap="none" rtlCol="0">
+            <a:spAutoFit/>
+          </a:bodyPr>
+          <a:lstStyle/>
+          <a:p>
+            <a:r>
+              <a:rPr lang="en-GB" dirty="0"/>
+              <a:t>Custom soldered circuit board for cleaner setup</a:t>
+            </a:r>
+            <a:endParaRPr lang="nl-BE" dirty="0"/>
+          </a:p>
+        </p:txBody>
+      </p:sp>
+      <p:sp>
+        <p:nvSpPr>
+          <p:cNvPr id="6" name="Tekstvak 5">
+            <a:extLst>
+              <a:ext uri="{FF2B5EF4-FFF2-40B4-BE49-F238E27FC236}">
+                <a16:creationId xmlns:a16="http://schemas.microsoft.com/office/drawing/2014/main" id="{E034852F-33AB-9403-4178-24E82A403C32}"/>
+              </a:ext>
+            </a:extLst>
+          </p:cNvPr>
+          <p:cNvSpPr txBox="1"/>
+          <p:nvPr/>
+        </p:nvSpPr>
+        <p:spPr>
+          <a:xfrm>
+            <a:off x="6624320" y="5728601"/>
+            <a:ext cx="4861331" cy="369332"/>
+          </a:xfrm>
+          <a:prstGeom prst="rect">
+            <a:avLst/>
+          </a:prstGeom>
+          <a:noFill/>
+        </p:spPr>
+        <p:txBody>
+          <a:bodyPr wrap="none" rtlCol="0">
+            <a:spAutoFit/>
+          </a:bodyPr>
+          <a:lstStyle/>
+          <a:p>
+            <a:r>
+              <a:rPr lang="en-GB" dirty="0"/>
+              <a:t>Full car setup along with black 3D printed frame</a:t>
+            </a:r>
+            <a:endParaRPr lang="nl-BE" dirty="0"/>
+          </a:p>
+        </p:txBody>
+      </p:sp>
+    </p:spTree>
+    <p:extLst>
+      <p:ext uri="{BB962C8B-B14F-4D97-AF65-F5344CB8AC3E}">
+        <p14:creationId xmlns:p14="http://schemas.microsoft.com/office/powerpoint/2010/main" val="1006793764"/>
+      </p:ext>
+    </p:extLst>
+  </p:cSld>
+  <p:clrMapOvr>
+    <a:masterClrMapping/>
+  </p:clrMapOvr>
+</p:sld>
+</file>
+
+<file path=ppt/slides/slide5.xml><?xml version="1.0" encoding="utf-8"?>
 <p:sld xmlns:a="http://schemas.openxmlformats.org/drawingml/2006/main" xmlns:r="http://schemas.openxmlformats.org/officeDocument/2006/relationships" xmlns:p="http://schemas.openxmlformats.org/presentationml/2006/main">
   <p:cSld>
     <p:bg>
@@ -7017,7 +7330,7 @@
 </p:sld>
 </file>
 
-<file path=ppt/slides/slide5.xml><?xml version="1.0" encoding="utf-8"?>
+<file path=ppt/slides/slide6.xml><?xml version="1.0" encoding="utf-8"?>
 <p:sld xmlns:a="http://schemas.openxmlformats.org/drawingml/2006/main" xmlns:r="http://schemas.openxmlformats.org/officeDocument/2006/relationships" xmlns:p="http://schemas.openxmlformats.org/presentationml/2006/main">
   <p:cSld>
     <p:bg>
@@ -7821,7 +8134,7 @@
 </p:sld>
 </file>
 
-<file path=ppt/slides/slide6.xml><?xml version="1.0" encoding="utf-8"?>
+<file path=ppt/slides/slide7.xml><?xml version="1.0" encoding="utf-8"?>
 <p:sld xmlns:a="http://schemas.openxmlformats.org/drawingml/2006/main" xmlns:r="http://schemas.openxmlformats.org/officeDocument/2006/relationships" xmlns:p="http://schemas.openxmlformats.org/presentationml/2006/main">
   <p:cSld>
     <p:bg>
@@ -8625,7 +8938,7 @@
 </p:sld>
 </file>
 
-<file path=ppt/slides/slide7.xml><?xml version="1.0" encoding="utf-8"?>
+<file path=ppt/slides/slide8.xml><?xml version="1.0" encoding="utf-8"?>
 <p:sld xmlns:a="http://schemas.openxmlformats.org/drawingml/2006/main" xmlns:r="http://schemas.openxmlformats.org/officeDocument/2006/relationships" xmlns:p="http://schemas.openxmlformats.org/presentationml/2006/main">
   <p:cSld>
     <p:bg>
@@ -9525,7 +9838,7 @@
 </p:sld>
 </file>
 
-<file path=ppt/slides/slide8.xml><?xml version="1.0" encoding="utf-8"?>
+<file path=ppt/slides/slide9.xml><?xml version="1.0" encoding="utf-8"?>
 <p:sld xmlns:a="http://schemas.openxmlformats.org/drawingml/2006/main" xmlns:r="http://schemas.openxmlformats.org/officeDocument/2006/relationships" xmlns:p="http://schemas.openxmlformats.org/presentationml/2006/main">
   <p:cSld>
     <p:bg>

</xml_diff>

<commit_message>
Updated ppt and paper
</commit_message>
<xml_diff>
--- a/Documentation/RC_CAR.pptx
+++ b/Documentation/RC_CAR.pptx
@@ -643,7 +643,7 @@
           <a:p>
             <a:fld id="{E9EF8655-73E4-44B9-B8C0-E21199306151}" type="datetimeFigureOut">
               <a:rPr lang="nl-BE" smtClean="0"/>
-              <a:t>2/12/2024</a:t>
+              <a:t>10/12/2024</a:t>
             </a:fld>
             <a:endParaRPr lang="nl-BE"/>
           </a:p>
@@ -1444,7 +1444,7 @@
           <a:p>
             <a:fld id="{7923C555-3AB5-4532-9E20-23C21D0CB45B}" type="datetimeFigureOut">
               <a:rPr lang="nl-BE" smtClean="0"/>
-              <a:t>2/12/2024</a:t>
+              <a:t>10/12/2024</a:t>
             </a:fld>
             <a:endParaRPr lang="nl-BE"/>
           </a:p>
@@ -1644,7 +1644,7 @@
           <a:p>
             <a:fld id="{7923C555-3AB5-4532-9E20-23C21D0CB45B}" type="datetimeFigureOut">
               <a:rPr lang="nl-BE" smtClean="0"/>
-              <a:t>2/12/2024</a:t>
+              <a:t>10/12/2024</a:t>
             </a:fld>
             <a:endParaRPr lang="nl-BE"/>
           </a:p>
@@ -1854,7 +1854,7 @@
           <a:p>
             <a:fld id="{7923C555-3AB5-4532-9E20-23C21D0CB45B}" type="datetimeFigureOut">
               <a:rPr lang="nl-BE" smtClean="0"/>
-              <a:t>2/12/2024</a:t>
+              <a:t>10/12/2024</a:t>
             </a:fld>
             <a:endParaRPr lang="nl-BE"/>
           </a:p>
@@ -2054,7 +2054,7 @@
           <a:p>
             <a:fld id="{7923C555-3AB5-4532-9E20-23C21D0CB45B}" type="datetimeFigureOut">
               <a:rPr lang="nl-BE" smtClean="0"/>
-              <a:t>2/12/2024</a:t>
+              <a:t>10/12/2024</a:t>
             </a:fld>
             <a:endParaRPr lang="nl-BE"/>
           </a:p>
@@ -2330,7 +2330,7 @@
           <a:p>
             <a:fld id="{7923C555-3AB5-4532-9E20-23C21D0CB45B}" type="datetimeFigureOut">
               <a:rPr lang="nl-BE" smtClean="0"/>
-              <a:t>2/12/2024</a:t>
+              <a:t>10/12/2024</a:t>
             </a:fld>
             <a:endParaRPr lang="nl-BE"/>
           </a:p>
@@ -2598,7 +2598,7 @@
           <a:p>
             <a:fld id="{7923C555-3AB5-4532-9E20-23C21D0CB45B}" type="datetimeFigureOut">
               <a:rPr lang="nl-BE" smtClean="0"/>
-              <a:t>2/12/2024</a:t>
+              <a:t>10/12/2024</a:t>
             </a:fld>
             <a:endParaRPr lang="nl-BE"/>
           </a:p>
@@ -3013,7 +3013,7 @@
           <a:p>
             <a:fld id="{7923C555-3AB5-4532-9E20-23C21D0CB45B}" type="datetimeFigureOut">
               <a:rPr lang="nl-BE" smtClean="0"/>
-              <a:t>2/12/2024</a:t>
+              <a:t>10/12/2024</a:t>
             </a:fld>
             <a:endParaRPr lang="nl-BE"/>
           </a:p>
@@ -3155,7 +3155,7 @@
           <a:p>
             <a:fld id="{7923C555-3AB5-4532-9E20-23C21D0CB45B}" type="datetimeFigureOut">
               <a:rPr lang="nl-BE" smtClean="0"/>
-              <a:t>2/12/2024</a:t>
+              <a:t>10/12/2024</a:t>
             </a:fld>
             <a:endParaRPr lang="nl-BE"/>
           </a:p>
@@ -3268,7 +3268,7 @@
           <a:p>
             <a:fld id="{7923C555-3AB5-4532-9E20-23C21D0CB45B}" type="datetimeFigureOut">
               <a:rPr lang="nl-BE" smtClean="0"/>
-              <a:t>2/12/2024</a:t>
+              <a:t>10/12/2024</a:t>
             </a:fld>
             <a:endParaRPr lang="nl-BE"/>
           </a:p>
@@ -3581,7 +3581,7 @@
           <a:p>
             <a:fld id="{7923C555-3AB5-4532-9E20-23C21D0CB45B}" type="datetimeFigureOut">
               <a:rPr lang="nl-BE" smtClean="0"/>
-              <a:t>2/12/2024</a:t>
+              <a:t>10/12/2024</a:t>
             </a:fld>
             <a:endParaRPr lang="nl-BE"/>
           </a:p>
@@ -3870,7 +3870,7 @@
           <a:p>
             <a:fld id="{7923C555-3AB5-4532-9E20-23C21D0CB45B}" type="datetimeFigureOut">
               <a:rPr lang="nl-BE" smtClean="0"/>
-              <a:t>2/12/2024</a:t>
+              <a:t>10/12/2024</a:t>
             </a:fld>
             <a:endParaRPr lang="nl-BE"/>
           </a:p>
@@ -4113,7 +4113,7 @@
           <a:p>
             <a:fld id="{7923C555-3AB5-4532-9E20-23C21D0CB45B}" type="datetimeFigureOut">
               <a:rPr lang="nl-BE" smtClean="0"/>
-              <a:t>2/12/2024</a:t>
+              <a:t>10/12/2024</a:t>
             </a:fld>
             <a:endParaRPr lang="nl-BE"/>
           </a:p>
@@ -6226,10 +6226,10 @@
       </p:grpSpPr>
       <p:sp useBgFill="1">
         <p:nvSpPr>
-          <p:cNvPr id="18" name="Rectangle 10">
+          <p:cNvPr id="24" name="Rectangle 23">
             <a:extLst>
               <a:ext uri="{FF2B5EF4-FFF2-40B4-BE49-F238E27FC236}">
-                <a16:creationId xmlns:a16="http://schemas.microsoft.com/office/drawing/2014/main" id="{2B97F24A-32CE-4C1C-A50D-3016B394DCFB}"/>
+                <a16:creationId xmlns:a16="http://schemas.microsoft.com/office/drawing/2014/main" id="{743AA782-23D1-4521-8CAD-47662984AA08}"/>
               </a:ext>
               <a:ext uri="{C183D7F6-B498-43B3-948B-1728B52AA6E4}">
                 <adec:decorative xmlns:adec="http://schemas.microsoft.com/office/drawing/2017/decorative" val="1"/>
@@ -6302,8 +6302,8 @@
         </p:nvSpPr>
         <p:spPr>
           <a:xfrm>
-            <a:off x="630936" y="639520"/>
-            <a:ext cx="3429000" cy="1719072"/>
+            <a:off x="630936" y="640080"/>
+            <a:ext cx="4818888" cy="1481328"/>
           </a:xfrm>
         </p:spPr>
         <p:txBody>
@@ -6328,10 +6328,10 @@
       </p:sp>
       <p:sp>
         <p:nvSpPr>
-          <p:cNvPr id="19" name="sketch line">
+          <p:cNvPr id="26" name="sketch line">
             <a:extLst>
               <a:ext uri="{FF2B5EF4-FFF2-40B4-BE49-F238E27FC236}">
-                <a16:creationId xmlns:a16="http://schemas.microsoft.com/office/drawing/2014/main" id="{CD8B4F24-440B-49E9-B85D-733523DC064B}"/>
+                <a16:creationId xmlns:a16="http://schemas.microsoft.com/office/drawing/2014/main" id="{650D18FE-0824-4A46-B22C-A86B52E5780A}"/>
               </a:ext>
               <a:ext uri="{C183D7F6-B498-43B3-948B-1728B52AA6E4}">
                 <adec:decorative xmlns:adec="http://schemas.microsoft.com/office/drawing/2017/decorative" val="1"/>
@@ -6351,7 +6351,7 @@
         </p:nvSpPr>
         <p:spPr>
           <a:xfrm>
-            <a:off x="643278" y="2573756"/>
+            <a:off x="643278" y="2372868"/>
             <a:ext cx="3255095" cy="18288"/>
           </a:xfrm>
           <a:custGeom>
@@ -6613,8 +6613,8 @@
         </p:nvSpPr>
         <p:spPr>
           <a:xfrm>
-            <a:off x="630936" y="2807208"/>
-            <a:ext cx="3429000" cy="3410712"/>
+            <a:off x="630936" y="2660904"/>
+            <a:ext cx="4818888" cy="3547872"/>
           </a:xfrm>
           <a:prstGeom prst="rect">
             <a:avLst/>
@@ -6677,10 +6677,10 @@
       </p:sp>
       <p:pic>
         <p:nvPicPr>
-          <p:cNvPr id="5" name="Afbeelding 4">
+          <p:cNvPr id="4" name="Afbeelding 3">
             <a:extLst>
               <a:ext uri="{FF2B5EF4-FFF2-40B4-BE49-F238E27FC236}">
-                <a16:creationId xmlns:a16="http://schemas.microsoft.com/office/drawing/2014/main" id="{BBA4F7C3-A248-67D1-7F8C-2A35CF94AFEF}"/>
+                <a16:creationId xmlns:a16="http://schemas.microsoft.com/office/drawing/2014/main" id="{2038D9ED-AC4E-B598-03BC-09EE4394EAD7}"/>
               </a:ext>
             </a:extLst>
           </p:cNvPr>
@@ -6697,8 +6697,8 @@
         </p:blipFill>
         <p:spPr>
           <a:xfrm>
-            <a:off x="4654296" y="1047217"/>
-            <a:ext cx="6903720" cy="4763566"/>
+            <a:off x="4948051" y="1008354"/>
+            <a:ext cx="7016365" cy="4841291"/>
           </a:xfrm>
           <a:prstGeom prst="rect">
             <a:avLst/>
@@ -7795,7 +7795,7 @@
         <p:spPr>
           <a:xfrm>
             <a:off x="6624320" y="5728601"/>
-            <a:ext cx="4861331" cy="369332"/>
+            <a:ext cx="5154725" cy="646331"/>
           </a:xfrm>
           <a:prstGeom prst="rect">
             <a:avLst/>
@@ -7803,19 +7803,55 @@
           <a:noFill/>
         </p:spPr>
         <p:txBody>
-          <a:bodyPr wrap="none" rtlCol="0">
+          <a:bodyPr wrap="square" rtlCol="0">
             <a:spAutoFit/>
           </a:bodyPr>
           <a:lstStyle/>
           <a:p>
             <a:r>
               <a:rPr lang="en-GB" dirty="0"/>
-              <a:t>Full car setup along with black 3D printed frame</a:t>
+              <a:t>Full car setup along with black 3D printed frame and battery</a:t>
             </a:r>
             <a:endParaRPr lang="nl-BE" dirty="0"/>
           </a:p>
         </p:txBody>
       </p:sp>
+      <p:pic>
+        <p:nvPicPr>
+          <p:cNvPr id="7" name="Afbeelding 6" descr="Afbeelding met Elektronisch onderdeel, Elektronische engineering, Stroomkringonderdeel, Elektrische bedrading&#10;&#10;Automatisch gegenereerde beschrijving">
+            <a:extLst>
+              <a:ext uri="{FF2B5EF4-FFF2-40B4-BE49-F238E27FC236}">
+                <a16:creationId xmlns:a16="http://schemas.microsoft.com/office/drawing/2014/main" id="{8EFE274C-7322-781A-E97C-A2945BB4B07F}"/>
+              </a:ext>
+            </a:extLst>
+          </p:cNvPr>
+          <p:cNvPicPr>
+            <a:picLocks noChangeAspect="1"/>
+          </p:cNvPicPr>
+          <p:nvPr/>
+        </p:nvPicPr>
+        <p:blipFill>
+          <a:blip r:embed="rId3">
+            <a:extLst>
+              <a:ext uri="{28A0092B-C50C-407E-A947-70E740481C1C}">
+                <a14:useLocalDpi xmlns:a14="http://schemas.microsoft.com/office/drawing/2010/main" val="0"/>
+              </a:ext>
+            </a:extLst>
+          </a:blip>
+          <a:stretch>
+            <a:fillRect/>
+          </a:stretch>
+        </p:blipFill>
+        <p:spPr>
+          <a:xfrm>
+            <a:off x="6624319" y="1776298"/>
+            <a:ext cx="4861331" cy="3645998"/>
+          </a:xfrm>
+          <a:prstGeom prst="rect">
+            <a:avLst/>
+          </a:prstGeom>
+        </p:spPr>
+      </p:pic>
     </p:spTree>
     <p:extLst>
       <p:ext uri="{BB962C8B-B14F-4D97-AF65-F5344CB8AC3E}">
@@ -12228,20 +12264,8 @@
               <a:buChar char="•"/>
             </a:pPr>
             <a:r>
-              <a:rPr lang="nl-BE" dirty="0" err="1"/>
-              <a:t>Seven</a:t>
-            </a:r>
-            <a:r>
               <a:rPr lang="nl-BE" dirty="0"/>
-              <a:t> </a:t>
-            </a:r>
-            <a:r>
-              <a:rPr lang="nl-BE" dirty="0" err="1"/>
-              <a:t>segments</a:t>
-            </a:r>
-            <a:r>
-              <a:rPr lang="nl-BE" dirty="0"/>
-              <a:t> driver </a:t>
+              <a:t>MAX7219 array driver </a:t>
             </a:r>
             <a:r>
               <a:rPr lang="nl-BE" dirty="0" err="1"/>

</xml_diff>

<commit_message>
added speedoemter to mqtt publish. This version of the code deos not work yet. MQTT received data is different from the sent data
</commit_message>
<xml_diff>
--- a/Documentation/RC_CAR.pptx
+++ b/Documentation/RC_CAR.pptx
@@ -7477,36 +7477,6 @@
           </a:p>
         </p:txBody>
       </p:sp>
-      <p:pic>
-        <p:nvPicPr>
-          <p:cNvPr id="4" name="Afbeelding 3" descr="Afbeelding met tekst, diagram, Plan, schermopname&#10;&#10;Automatisch gegenereerde beschrijving">
-            <a:extLst>
-              <a:ext uri="{FF2B5EF4-FFF2-40B4-BE49-F238E27FC236}">
-                <a16:creationId xmlns:a16="http://schemas.microsoft.com/office/drawing/2014/main" id="{01538E62-B75B-C5C4-15AE-227C6DA15D67}"/>
-              </a:ext>
-            </a:extLst>
-          </p:cNvPr>
-          <p:cNvPicPr>
-            <a:picLocks noChangeAspect="1"/>
-          </p:cNvPicPr>
-          <p:nvPr/>
-        </p:nvPicPr>
-        <p:blipFill>
-          <a:blip r:embed="rId2"/>
-          <a:stretch>
-            <a:fillRect/>
-          </a:stretch>
-        </p:blipFill>
-        <p:spPr>
-          <a:xfrm>
-            <a:off x="501445" y="2055813"/>
-            <a:ext cx="6188177" cy="4296880"/>
-          </a:xfrm>
-          <a:prstGeom prst="rect">
-            <a:avLst/>
-          </a:prstGeom>
-        </p:spPr>
-      </p:pic>
       <p:sp>
         <p:nvSpPr>
           <p:cNvPr id="5" name="Tekstvak 4">
@@ -7631,6 +7601,36 @@
           </a:p>
         </p:txBody>
       </p:sp>
+      <p:pic>
+        <p:nvPicPr>
+          <p:cNvPr id="6" name="Afbeelding 5">
+            <a:extLst>
+              <a:ext uri="{FF2B5EF4-FFF2-40B4-BE49-F238E27FC236}">
+                <a16:creationId xmlns:a16="http://schemas.microsoft.com/office/drawing/2014/main" id="{E60886F7-CC3E-96BE-A91D-F832136763A0}"/>
+              </a:ext>
+            </a:extLst>
+          </p:cNvPr>
+          <p:cNvPicPr>
+            <a:picLocks noChangeAspect="1"/>
+          </p:cNvPicPr>
+          <p:nvPr/>
+        </p:nvPicPr>
+        <p:blipFill>
+          <a:blip r:embed="rId2"/>
+          <a:stretch>
+            <a:fillRect/>
+          </a:stretch>
+        </p:blipFill>
+        <p:spPr>
+          <a:xfrm>
+            <a:off x="669036" y="2079582"/>
+            <a:ext cx="6040702" cy="4001320"/>
+          </a:xfrm>
+          <a:prstGeom prst="rect">
+            <a:avLst/>
+          </a:prstGeom>
+        </p:spPr>
+      </p:pic>
     </p:spTree>
     <p:extLst>
       <p:ext uri="{BB962C8B-B14F-4D97-AF65-F5344CB8AC3E}">
@@ -10449,35 +10449,103 @@
           </a:p>
         </p:txBody>
       </p:sp>
+      <p:pic>
+        <p:nvPicPr>
+          <p:cNvPr id="5" name="Afbeelding 4">
+            <a:extLst>
+              <a:ext uri="{FF2B5EF4-FFF2-40B4-BE49-F238E27FC236}">
+                <a16:creationId xmlns:a16="http://schemas.microsoft.com/office/drawing/2014/main" id="{BDDB2EB2-3A7D-21E4-EF6F-97757A1D77C3}"/>
+              </a:ext>
+            </a:extLst>
+          </p:cNvPr>
+          <p:cNvPicPr>
+            <a:picLocks noChangeAspect="1"/>
+          </p:cNvPicPr>
+          <p:nvPr/>
+        </p:nvPicPr>
+        <p:blipFill>
+          <a:blip r:embed="rId2"/>
+          <a:stretch>
+            <a:fillRect/>
+          </a:stretch>
+        </p:blipFill>
+        <p:spPr>
+          <a:xfrm>
+            <a:off x="3058160" y="2055813"/>
+            <a:ext cx="8148320" cy="4581572"/>
+          </a:xfrm>
+          <a:prstGeom prst="rect">
+            <a:avLst/>
+          </a:prstGeom>
+        </p:spPr>
+      </p:pic>
       <p:sp>
         <p:nvSpPr>
-          <p:cNvPr id="3" name="Tijdelijke aanduiding voor inhoud 2">
+          <p:cNvPr id="6" name="Tekstvak 5">
             <a:extLst>
               <a:ext uri="{FF2B5EF4-FFF2-40B4-BE49-F238E27FC236}">
-                <a16:creationId xmlns:a16="http://schemas.microsoft.com/office/drawing/2014/main" id="{DF3CD094-861A-478F-BA85-E0817FC7CB9F}"/>
+                <a16:creationId xmlns:a16="http://schemas.microsoft.com/office/drawing/2014/main" id="{8F0F7A7F-4080-F52B-BF43-2CB783A8F507}"/>
               </a:ext>
             </a:extLst>
           </p:cNvPr>
-          <p:cNvSpPr>
-            <a:spLocks noGrp="1"/>
-          </p:cNvSpPr>
-          <p:nvPr>
-            <p:ph idx="1"/>
-          </p:nvPr>
+          <p:cNvSpPr txBox="1"/>
+          <p:nvPr/>
         </p:nvSpPr>
         <p:spPr>
           <a:xfrm>
-            <a:off x="838200" y="1929384"/>
-            <a:ext cx="10515600" cy="4251960"/>
+            <a:off x="304800" y="2641600"/>
+            <a:ext cx="3362960" cy="1200329"/>
           </a:xfrm>
+          <a:prstGeom prst="rect">
+            <a:avLst/>
+          </a:prstGeom>
+          <a:noFill/>
         </p:spPr>
         <p:txBody>
-          <a:bodyPr>
-            <a:normAutofit/>
+          <a:bodyPr wrap="square" rtlCol="0">
+            <a:spAutoFit/>
           </a:bodyPr>
           <a:lstStyle/>
           <a:p>
-            <a:endParaRPr lang="nl-BE" sz="2200"/>
+            <a:pPr marL="285750" indent="-285750">
+              <a:buFont typeface="Arial" panose="020B0604020202020204" pitchFamily="34" charset="0"/>
+              <a:buChar char="•"/>
+            </a:pPr>
+            <a:r>
+              <a:rPr lang="en-GB" dirty="0"/>
+              <a:t>MPU6050 data</a:t>
+            </a:r>
+          </a:p>
+          <a:p>
+            <a:pPr marL="285750" indent="-285750">
+              <a:buFont typeface="Arial" panose="020B0604020202020204" pitchFamily="34" charset="0"/>
+              <a:buChar char="•"/>
+            </a:pPr>
+            <a:r>
+              <a:rPr lang="en-GB" dirty="0"/>
+              <a:t>Car orientation</a:t>
+            </a:r>
+          </a:p>
+          <a:p>
+            <a:pPr marL="285750" indent="-285750">
+              <a:buFont typeface="Arial" panose="020B0604020202020204" pitchFamily="34" charset="0"/>
+              <a:buChar char="•"/>
+            </a:pPr>
+            <a:r>
+              <a:rPr lang="en-GB" dirty="0"/>
+              <a:t>Reset orientation</a:t>
+            </a:r>
+          </a:p>
+          <a:p>
+            <a:pPr marL="285750" indent="-285750">
+              <a:buFont typeface="Arial" panose="020B0604020202020204" pitchFamily="34" charset="0"/>
+              <a:buChar char="•"/>
+            </a:pPr>
+            <a:r>
+              <a:rPr lang="en-GB" dirty="0"/>
+              <a:t>Motor control</a:t>
+            </a:r>
+            <a:endParaRPr lang="nl-BE" dirty="0"/>
           </a:p>
         </p:txBody>
       </p:sp>

</xml_diff>

<commit_message>
speedometer works fine. Is also displayed on UI. Updated UI and reports a bit
</commit_message>
<xml_diff>
--- a/Documentation/RC_CAR.pptx
+++ b/Documentation/RC_CAR.pptx
@@ -643,7 +643,7 @@
           <a:p>
             <a:fld id="{E9EF8655-73E4-44B9-B8C0-E21199306151}" type="datetimeFigureOut">
               <a:rPr lang="nl-BE" smtClean="0"/>
-              <a:t>10/12/2024</a:t>
+              <a:t>11/12/2024</a:t>
             </a:fld>
             <a:endParaRPr lang="nl-BE"/>
           </a:p>
@@ -1444,7 +1444,7 @@
           <a:p>
             <a:fld id="{7923C555-3AB5-4532-9E20-23C21D0CB45B}" type="datetimeFigureOut">
               <a:rPr lang="nl-BE" smtClean="0"/>
-              <a:t>10/12/2024</a:t>
+              <a:t>11/12/2024</a:t>
             </a:fld>
             <a:endParaRPr lang="nl-BE"/>
           </a:p>
@@ -1644,7 +1644,7 @@
           <a:p>
             <a:fld id="{7923C555-3AB5-4532-9E20-23C21D0CB45B}" type="datetimeFigureOut">
               <a:rPr lang="nl-BE" smtClean="0"/>
-              <a:t>10/12/2024</a:t>
+              <a:t>11/12/2024</a:t>
             </a:fld>
             <a:endParaRPr lang="nl-BE"/>
           </a:p>
@@ -1854,7 +1854,7 @@
           <a:p>
             <a:fld id="{7923C555-3AB5-4532-9E20-23C21D0CB45B}" type="datetimeFigureOut">
               <a:rPr lang="nl-BE" smtClean="0"/>
-              <a:t>10/12/2024</a:t>
+              <a:t>11/12/2024</a:t>
             </a:fld>
             <a:endParaRPr lang="nl-BE"/>
           </a:p>
@@ -2054,7 +2054,7 @@
           <a:p>
             <a:fld id="{7923C555-3AB5-4532-9E20-23C21D0CB45B}" type="datetimeFigureOut">
               <a:rPr lang="nl-BE" smtClean="0"/>
-              <a:t>10/12/2024</a:t>
+              <a:t>11/12/2024</a:t>
             </a:fld>
             <a:endParaRPr lang="nl-BE"/>
           </a:p>
@@ -2330,7 +2330,7 @@
           <a:p>
             <a:fld id="{7923C555-3AB5-4532-9E20-23C21D0CB45B}" type="datetimeFigureOut">
               <a:rPr lang="nl-BE" smtClean="0"/>
-              <a:t>10/12/2024</a:t>
+              <a:t>11/12/2024</a:t>
             </a:fld>
             <a:endParaRPr lang="nl-BE"/>
           </a:p>
@@ -2598,7 +2598,7 @@
           <a:p>
             <a:fld id="{7923C555-3AB5-4532-9E20-23C21D0CB45B}" type="datetimeFigureOut">
               <a:rPr lang="nl-BE" smtClean="0"/>
-              <a:t>10/12/2024</a:t>
+              <a:t>11/12/2024</a:t>
             </a:fld>
             <a:endParaRPr lang="nl-BE"/>
           </a:p>
@@ -3013,7 +3013,7 @@
           <a:p>
             <a:fld id="{7923C555-3AB5-4532-9E20-23C21D0CB45B}" type="datetimeFigureOut">
               <a:rPr lang="nl-BE" smtClean="0"/>
-              <a:t>10/12/2024</a:t>
+              <a:t>11/12/2024</a:t>
             </a:fld>
             <a:endParaRPr lang="nl-BE"/>
           </a:p>
@@ -3155,7 +3155,7 @@
           <a:p>
             <a:fld id="{7923C555-3AB5-4532-9E20-23C21D0CB45B}" type="datetimeFigureOut">
               <a:rPr lang="nl-BE" smtClean="0"/>
-              <a:t>10/12/2024</a:t>
+              <a:t>11/12/2024</a:t>
             </a:fld>
             <a:endParaRPr lang="nl-BE"/>
           </a:p>
@@ -3268,7 +3268,7 @@
           <a:p>
             <a:fld id="{7923C555-3AB5-4532-9E20-23C21D0CB45B}" type="datetimeFigureOut">
               <a:rPr lang="nl-BE" smtClean="0"/>
-              <a:t>10/12/2024</a:t>
+              <a:t>11/12/2024</a:t>
             </a:fld>
             <a:endParaRPr lang="nl-BE"/>
           </a:p>
@@ -3581,7 +3581,7 @@
           <a:p>
             <a:fld id="{7923C555-3AB5-4532-9E20-23C21D0CB45B}" type="datetimeFigureOut">
               <a:rPr lang="nl-BE" smtClean="0"/>
-              <a:t>10/12/2024</a:t>
+              <a:t>11/12/2024</a:t>
             </a:fld>
             <a:endParaRPr lang="nl-BE"/>
           </a:p>
@@ -3870,7 +3870,7 @@
           <a:p>
             <a:fld id="{7923C555-3AB5-4532-9E20-23C21D0CB45B}" type="datetimeFigureOut">
               <a:rPr lang="nl-BE" smtClean="0"/>
-              <a:t>10/12/2024</a:t>
+              <a:t>11/12/2024</a:t>
             </a:fld>
             <a:endParaRPr lang="nl-BE"/>
           </a:p>
@@ -4113,7 +4113,7 @@
           <a:p>
             <a:fld id="{7923C555-3AB5-4532-9E20-23C21D0CB45B}" type="datetimeFigureOut">
               <a:rPr lang="nl-BE" smtClean="0"/>
-              <a:t>10/12/2024</a:t>
+              <a:t>11/12/2024</a:t>
             </a:fld>
             <a:endParaRPr lang="nl-BE"/>
           </a:p>
@@ -10449,12 +10449,92 @@
           </a:p>
         </p:txBody>
       </p:sp>
+      <p:sp>
+        <p:nvSpPr>
+          <p:cNvPr id="6" name="Tekstvak 5">
+            <a:extLst>
+              <a:ext uri="{FF2B5EF4-FFF2-40B4-BE49-F238E27FC236}">
+                <a16:creationId xmlns:a16="http://schemas.microsoft.com/office/drawing/2014/main" id="{8F0F7A7F-4080-F52B-BF43-2CB783A8F507}"/>
+              </a:ext>
+            </a:extLst>
+          </p:cNvPr>
+          <p:cNvSpPr txBox="1"/>
+          <p:nvPr/>
+        </p:nvSpPr>
+        <p:spPr>
+          <a:xfrm>
+            <a:off x="304800" y="2641600"/>
+            <a:ext cx="3362960" cy="1477328"/>
+          </a:xfrm>
+          <a:prstGeom prst="rect">
+            <a:avLst/>
+          </a:prstGeom>
+          <a:noFill/>
+        </p:spPr>
+        <p:txBody>
+          <a:bodyPr wrap="square" rtlCol="0">
+            <a:spAutoFit/>
+          </a:bodyPr>
+          <a:lstStyle/>
+          <a:p>
+            <a:pPr marL="285750" indent="-285750">
+              <a:buFont typeface="Arial" panose="020B0604020202020204" pitchFamily="34" charset="0"/>
+              <a:buChar char="•"/>
+            </a:pPr>
+            <a:r>
+              <a:rPr lang="en-GB" dirty="0"/>
+              <a:t>MPU6050 data</a:t>
+            </a:r>
+          </a:p>
+          <a:p>
+            <a:pPr marL="285750" indent="-285750">
+              <a:buFont typeface="Arial" panose="020B0604020202020204" pitchFamily="34" charset="0"/>
+              <a:buChar char="•"/>
+            </a:pPr>
+            <a:r>
+              <a:rPr lang="en-GB" dirty="0"/>
+              <a:t>Car orientation</a:t>
+            </a:r>
+          </a:p>
+          <a:p>
+            <a:pPr marL="285750" indent="-285750">
+              <a:buFont typeface="Arial" panose="020B0604020202020204" pitchFamily="34" charset="0"/>
+              <a:buChar char="•"/>
+            </a:pPr>
+            <a:r>
+              <a:rPr lang="en-GB" dirty="0"/>
+              <a:t>Speedometer data</a:t>
+            </a:r>
+          </a:p>
+          <a:p>
+            <a:pPr marL="285750" indent="-285750">
+              <a:buFont typeface="Arial" panose="020B0604020202020204" pitchFamily="34" charset="0"/>
+              <a:buChar char="•"/>
+            </a:pPr>
+            <a:r>
+              <a:rPr lang="en-GB" dirty="0"/>
+              <a:t>Reset orientation</a:t>
+            </a:r>
+          </a:p>
+          <a:p>
+            <a:pPr marL="285750" indent="-285750">
+              <a:buFont typeface="Arial" panose="020B0604020202020204" pitchFamily="34" charset="0"/>
+              <a:buChar char="•"/>
+            </a:pPr>
+            <a:r>
+              <a:rPr lang="en-GB" dirty="0"/>
+              <a:t>Motor control</a:t>
+            </a:r>
+            <a:endParaRPr lang="nl-BE" dirty="0"/>
+          </a:p>
+        </p:txBody>
+      </p:sp>
       <p:pic>
         <p:nvPicPr>
-          <p:cNvPr id="5" name="Afbeelding 4">
+          <p:cNvPr id="4" name="Afbeelding 3">
             <a:extLst>
               <a:ext uri="{FF2B5EF4-FFF2-40B4-BE49-F238E27FC236}">
-                <a16:creationId xmlns:a16="http://schemas.microsoft.com/office/drawing/2014/main" id="{BDDB2EB2-3A7D-21E4-EF6F-97757A1D77C3}"/>
+                <a16:creationId xmlns:a16="http://schemas.microsoft.com/office/drawing/2014/main" id="{8F246F6F-0F80-CC95-B93D-8929E6454FD9}"/>
               </a:ext>
             </a:extLst>
           </p:cNvPr>
@@ -10471,84 +10551,14 @@
         </p:blipFill>
         <p:spPr>
           <a:xfrm>
-            <a:off x="3058160" y="2055813"/>
-            <a:ext cx="8148320" cy="4581572"/>
+            <a:off x="3727662" y="2309675"/>
+            <a:ext cx="7626138" cy="3924364"/>
           </a:xfrm>
           <a:prstGeom prst="rect">
             <a:avLst/>
           </a:prstGeom>
         </p:spPr>
       </p:pic>
-      <p:sp>
-        <p:nvSpPr>
-          <p:cNvPr id="6" name="Tekstvak 5">
-            <a:extLst>
-              <a:ext uri="{FF2B5EF4-FFF2-40B4-BE49-F238E27FC236}">
-                <a16:creationId xmlns:a16="http://schemas.microsoft.com/office/drawing/2014/main" id="{8F0F7A7F-4080-F52B-BF43-2CB783A8F507}"/>
-              </a:ext>
-            </a:extLst>
-          </p:cNvPr>
-          <p:cNvSpPr txBox="1"/>
-          <p:nvPr/>
-        </p:nvSpPr>
-        <p:spPr>
-          <a:xfrm>
-            <a:off x="304800" y="2641600"/>
-            <a:ext cx="3362960" cy="1200329"/>
-          </a:xfrm>
-          <a:prstGeom prst="rect">
-            <a:avLst/>
-          </a:prstGeom>
-          <a:noFill/>
-        </p:spPr>
-        <p:txBody>
-          <a:bodyPr wrap="square" rtlCol="0">
-            <a:spAutoFit/>
-          </a:bodyPr>
-          <a:lstStyle/>
-          <a:p>
-            <a:pPr marL="285750" indent="-285750">
-              <a:buFont typeface="Arial" panose="020B0604020202020204" pitchFamily="34" charset="0"/>
-              <a:buChar char="•"/>
-            </a:pPr>
-            <a:r>
-              <a:rPr lang="en-GB" dirty="0"/>
-              <a:t>MPU6050 data</a:t>
-            </a:r>
-          </a:p>
-          <a:p>
-            <a:pPr marL="285750" indent="-285750">
-              <a:buFont typeface="Arial" panose="020B0604020202020204" pitchFamily="34" charset="0"/>
-              <a:buChar char="•"/>
-            </a:pPr>
-            <a:r>
-              <a:rPr lang="en-GB" dirty="0"/>
-              <a:t>Car orientation</a:t>
-            </a:r>
-          </a:p>
-          <a:p>
-            <a:pPr marL="285750" indent="-285750">
-              <a:buFont typeface="Arial" panose="020B0604020202020204" pitchFamily="34" charset="0"/>
-              <a:buChar char="•"/>
-            </a:pPr>
-            <a:r>
-              <a:rPr lang="en-GB" dirty="0"/>
-              <a:t>Reset orientation</a:t>
-            </a:r>
-          </a:p>
-          <a:p>
-            <a:pPr marL="285750" indent="-285750">
-              <a:buFont typeface="Arial" panose="020B0604020202020204" pitchFamily="34" charset="0"/>
-              <a:buChar char="•"/>
-            </a:pPr>
-            <a:r>
-              <a:rPr lang="en-GB" dirty="0"/>
-              <a:t>Motor control</a:t>
-            </a:r>
-            <a:endParaRPr lang="nl-BE" dirty="0"/>
-          </a:p>
-        </p:txBody>
-      </p:sp>
     </p:spTree>
     <p:extLst>
       <p:ext uri="{BB962C8B-B14F-4D97-AF65-F5344CB8AC3E}">
@@ -12242,7 +12252,7 @@
         <p:spPr>
           <a:xfrm>
             <a:off x="7109355" y="2926080"/>
-            <a:ext cx="5224885" cy="1754326"/>
+            <a:ext cx="5224885" cy="2031325"/>
           </a:xfrm>
           <a:prstGeom prst="rect">
             <a:avLst/>
@@ -12342,6 +12352,16 @@
             <a:r>
               <a:rPr lang="nl-BE" dirty="0"/>
               <a:t> showcase speed</a:t>
+            </a:r>
+          </a:p>
+          <a:p>
+            <a:pPr marL="285750" indent="-285750">
+              <a:buFont typeface="Arial" panose="020B0604020202020204" pitchFamily="34" charset="0"/>
+              <a:buChar char="•"/>
+            </a:pPr>
+            <a:r>
+              <a:rPr lang="nl-BE" dirty="0"/>
+              <a:t>DARREN UIPDATE8888!!!!!</a:t>
             </a:r>
           </a:p>
           <a:p>

</xml_diff>

<commit_message>
added software architecture text in the paper, PPT is updated back to 7segments displays. Miro is also adjusted back again to 7segments.
</commit_message>
<xml_diff>
--- a/Documentation/RC_CAR.pptx
+++ b/Documentation/RC_CAR.pptx
@@ -643,7 +643,7 @@
           <a:p>
             <a:fld id="{E9EF8655-73E4-44B9-B8C0-E21199306151}" type="datetimeFigureOut">
               <a:rPr lang="nl-BE" smtClean="0"/>
-              <a:t>11/12/2024</a:t>
+              <a:t>12/12/2024</a:t>
             </a:fld>
             <a:endParaRPr lang="nl-BE"/>
           </a:p>
@@ -1444,7 +1444,7 @@
           <a:p>
             <a:fld id="{7923C555-3AB5-4532-9E20-23C21D0CB45B}" type="datetimeFigureOut">
               <a:rPr lang="nl-BE" smtClean="0"/>
-              <a:t>11/12/2024</a:t>
+              <a:t>12/12/2024</a:t>
             </a:fld>
             <a:endParaRPr lang="nl-BE"/>
           </a:p>
@@ -1644,7 +1644,7 @@
           <a:p>
             <a:fld id="{7923C555-3AB5-4532-9E20-23C21D0CB45B}" type="datetimeFigureOut">
               <a:rPr lang="nl-BE" smtClean="0"/>
-              <a:t>11/12/2024</a:t>
+              <a:t>12/12/2024</a:t>
             </a:fld>
             <a:endParaRPr lang="nl-BE"/>
           </a:p>
@@ -1854,7 +1854,7 @@
           <a:p>
             <a:fld id="{7923C555-3AB5-4532-9E20-23C21D0CB45B}" type="datetimeFigureOut">
               <a:rPr lang="nl-BE" smtClean="0"/>
-              <a:t>11/12/2024</a:t>
+              <a:t>12/12/2024</a:t>
             </a:fld>
             <a:endParaRPr lang="nl-BE"/>
           </a:p>
@@ -2054,7 +2054,7 @@
           <a:p>
             <a:fld id="{7923C555-3AB5-4532-9E20-23C21D0CB45B}" type="datetimeFigureOut">
               <a:rPr lang="nl-BE" smtClean="0"/>
-              <a:t>11/12/2024</a:t>
+              <a:t>12/12/2024</a:t>
             </a:fld>
             <a:endParaRPr lang="nl-BE"/>
           </a:p>
@@ -2330,7 +2330,7 @@
           <a:p>
             <a:fld id="{7923C555-3AB5-4532-9E20-23C21D0CB45B}" type="datetimeFigureOut">
               <a:rPr lang="nl-BE" smtClean="0"/>
-              <a:t>11/12/2024</a:t>
+              <a:t>12/12/2024</a:t>
             </a:fld>
             <a:endParaRPr lang="nl-BE"/>
           </a:p>
@@ -2598,7 +2598,7 @@
           <a:p>
             <a:fld id="{7923C555-3AB5-4532-9E20-23C21D0CB45B}" type="datetimeFigureOut">
               <a:rPr lang="nl-BE" smtClean="0"/>
-              <a:t>11/12/2024</a:t>
+              <a:t>12/12/2024</a:t>
             </a:fld>
             <a:endParaRPr lang="nl-BE"/>
           </a:p>
@@ -3013,7 +3013,7 @@
           <a:p>
             <a:fld id="{7923C555-3AB5-4532-9E20-23C21D0CB45B}" type="datetimeFigureOut">
               <a:rPr lang="nl-BE" smtClean="0"/>
-              <a:t>11/12/2024</a:t>
+              <a:t>12/12/2024</a:t>
             </a:fld>
             <a:endParaRPr lang="nl-BE"/>
           </a:p>
@@ -3155,7 +3155,7 @@
           <a:p>
             <a:fld id="{7923C555-3AB5-4532-9E20-23C21D0CB45B}" type="datetimeFigureOut">
               <a:rPr lang="nl-BE" smtClean="0"/>
-              <a:t>11/12/2024</a:t>
+              <a:t>12/12/2024</a:t>
             </a:fld>
             <a:endParaRPr lang="nl-BE"/>
           </a:p>
@@ -3268,7 +3268,7 @@
           <a:p>
             <a:fld id="{7923C555-3AB5-4532-9E20-23C21D0CB45B}" type="datetimeFigureOut">
               <a:rPr lang="nl-BE" smtClean="0"/>
-              <a:t>11/12/2024</a:t>
+              <a:t>12/12/2024</a:t>
             </a:fld>
             <a:endParaRPr lang="nl-BE"/>
           </a:p>
@@ -3581,7 +3581,7 @@
           <a:p>
             <a:fld id="{7923C555-3AB5-4532-9E20-23C21D0CB45B}" type="datetimeFigureOut">
               <a:rPr lang="nl-BE" smtClean="0"/>
-              <a:t>11/12/2024</a:t>
+              <a:t>12/12/2024</a:t>
             </a:fld>
             <a:endParaRPr lang="nl-BE"/>
           </a:p>
@@ -3870,7 +3870,7 @@
           <a:p>
             <a:fld id="{7923C555-3AB5-4532-9E20-23C21D0CB45B}" type="datetimeFigureOut">
               <a:rPr lang="nl-BE" smtClean="0"/>
-              <a:t>11/12/2024</a:t>
+              <a:t>12/12/2024</a:t>
             </a:fld>
             <a:endParaRPr lang="nl-BE"/>
           </a:p>
@@ -4113,7 +4113,7 @@
           <a:p>
             <a:fld id="{7923C555-3AB5-4532-9E20-23C21D0CB45B}" type="datetimeFigureOut">
               <a:rPr lang="nl-BE" smtClean="0"/>
-              <a:t>11/12/2024</a:t>
+              <a:t>12/12/2024</a:t>
             </a:fld>
             <a:endParaRPr lang="nl-BE"/>
           </a:p>
@@ -9449,7 +9449,7 @@
         <p:spPr>
           <a:xfrm>
             <a:off x="7109355" y="2926080"/>
-            <a:ext cx="5079597" cy="2862322"/>
+            <a:ext cx="5079597" cy="2308324"/>
           </a:xfrm>
           <a:prstGeom prst="rect">
             <a:avLst/>
@@ -9544,39 +9544,6 @@
               <a:buChar char="•"/>
             </a:pPr>
             <a:r>
-              <a:rPr lang="en-US" dirty="0" err="1"/>
-              <a:t>Truststores</a:t>
-            </a:r>
-            <a:r>
-              <a:rPr lang="en-US" dirty="0"/>
-              <a:t> are a special kind of </a:t>
-            </a:r>
-            <a:r>
-              <a:rPr lang="nl-NL" dirty="0">
-                <a:hlinkClick r:id="rId3"/>
-              </a:rPr>
-              <a:t>Java </a:t>
-            </a:r>
-            <a:r>
-              <a:rPr lang="nl-NL" dirty="0" err="1">
-                <a:hlinkClick r:id="rId3"/>
-              </a:rPr>
-              <a:t>KeyStores</a:t>
-            </a:r>
-            <a:r>
-              <a:rPr lang="nl-NL" dirty="0">
-                <a:hlinkClick r:id="rId3"/>
-              </a:rPr>
-              <a:t>(JKS)</a:t>
-            </a:r>
-            <a:endParaRPr lang="nl-NL" dirty="0"/>
-          </a:p>
-          <a:p>
-            <a:pPr marL="285750" indent="-285750">
-              <a:buFont typeface="Arial" panose="020B0604020202020204" pitchFamily="34" charset="0"/>
-              <a:buChar char="•"/>
-            </a:pPr>
-            <a:r>
               <a:rPr lang="nl-NL" dirty="0" err="1">
                 <a:latin typeface="Aptos" panose="020B0004020202020204" pitchFamily="34" charset="0"/>
                 <a:cs typeface="Arial" panose="020B0604020202020204" pitchFamily="34" charset="0"/>
@@ -9659,7 +9626,7 @@
           </p:nvPr>
         </p:nvPicPr>
         <p:blipFill>
-          <a:blip r:embed="rId4">
+          <a:blip r:embed="rId3">
             <a:extLst>
               <a:ext uri="{28A0092B-C50C-407E-A947-70E740481C1C}">
                 <a14:useLocalDpi xmlns:a14="http://schemas.microsoft.com/office/drawing/2010/main" val="0"/>
@@ -12252,7 +12219,7 @@
         <p:spPr>
           <a:xfrm>
             <a:off x="7109355" y="2926080"/>
-            <a:ext cx="5224885" cy="2031325"/>
+            <a:ext cx="5224885" cy="1477328"/>
           </a:xfrm>
           <a:prstGeom prst="rect">
             <a:avLst/>
@@ -12343,33 +12310,32 @@
             </a:pPr>
             <a:r>
               <a:rPr lang="nl-BE" dirty="0"/>
-              <a:t>MAX7219 array driver </a:t>
+              <a:t>Show speed on </a:t>
             </a:r>
             <a:r>
               <a:rPr lang="nl-BE" dirty="0" err="1"/>
-              <a:t>to</a:t>
+              <a:t>two</a:t>
             </a:r>
             <a:r>
               <a:rPr lang="nl-BE" dirty="0"/>
-              <a:t> showcase speed</a:t>
-            </a:r>
-          </a:p>
-          <a:p>
-            <a:pPr marL="285750" indent="-285750">
-              <a:buFont typeface="Arial" panose="020B0604020202020204" pitchFamily="34" charset="0"/>
-              <a:buChar char="•"/>
-            </a:pPr>
+              <a:t> </a:t>
+            </a:r>
+            <a:r>
+              <a:rPr lang="nl-BE" dirty="0" err="1"/>
+              <a:t>seven</a:t>
+            </a:r>
             <a:r>
               <a:rPr lang="nl-BE" dirty="0"/>
-              <a:t>DARREN UIPDATE8888!!!!!</a:t>
-            </a:r>
-          </a:p>
-          <a:p>
-            <a:pPr marL="285750" indent="-285750">
-              <a:buFont typeface="Arial" panose="020B0604020202020204" pitchFamily="34" charset="0"/>
-              <a:buChar char="•"/>
-            </a:pPr>
-            <a:endParaRPr lang="nl-BE" dirty="0"/>
+              <a:t> </a:t>
+            </a:r>
+            <a:r>
+              <a:rPr lang="nl-BE" dirty="0" err="1"/>
+              <a:t>segments</a:t>
+            </a:r>
+            <a:r>
+              <a:rPr lang="nl-BE" dirty="0"/>
+              <a:t> displays</a:t>
+            </a:r>
           </a:p>
         </p:txBody>
       </p:sp>

</xml_diff>